<commit_message>
make decision tree pdf
</commit_message>
<xml_diff>
--- a/ML Algorithm/Classification/Decision Tree.pptx
+++ b/ML Algorithm/Classification/Decision Tree.pptx
@@ -278,7 +278,7 @@
           <a:p>
             <a:fld id="{503EB4F8-4288-471F-A3E1-AA90CF1BD8E3}" type="datetimeFigureOut">
               <a:rPr lang="en-US" smtClean="0"/>
-              <a:t>10/15/2022</a:t>
+              <a:t>1/13/2023</a:t>
             </a:fld>
             <a:endParaRPr lang="en-US"/>
           </a:p>
@@ -476,7 +476,7 @@
           <a:p>
             <a:fld id="{503EB4F8-4288-471F-A3E1-AA90CF1BD8E3}" type="datetimeFigureOut">
               <a:rPr lang="en-US" smtClean="0"/>
-              <a:t>10/15/2022</a:t>
+              <a:t>1/13/2023</a:t>
             </a:fld>
             <a:endParaRPr lang="en-US"/>
           </a:p>
@@ -684,7 +684,7 @@
           <a:p>
             <a:fld id="{503EB4F8-4288-471F-A3E1-AA90CF1BD8E3}" type="datetimeFigureOut">
               <a:rPr lang="en-US" smtClean="0"/>
-              <a:t>10/15/2022</a:t>
+              <a:t>1/13/2023</a:t>
             </a:fld>
             <a:endParaRPr lang="en-US"/>
           </a:p>
@@ -882,7 +882,7 @@
           <a:p>
             <a:fld id="{503EB4F8-4288-471F-A3E1-AA90CF1BD8E3}" type="datetimeFigureOut">
               <a:rPr lang="en-US" smtClean="0"/>
-              <a:t>10/15/2022</a:t>
+              <a:t>1/13/2023</a:t>
             </a:fld>
             <a:endParaRPr lang="en-US"/>
           </a:p>
@@ -1157,7 +1157,7 @@
           <a:p>
             <a:fld id="{503EB4F8-4288-471F-A3E1-AA90CF1BD8E3}" type="datetimeFigureOut">
               <a:rPr lang="en-US" smtClean="0"/>
-              <a:t>10/15/2022</a:t>
+              <a:t>1/13/2023</a:t>
             </a:fld>
             <a:endParaRPr lang="en-US"/>
           </a:p>
@@ -1422,7 +1422,7 @@
           <a:p>
             <a:fld id="{503EB4F8-4288-471F-A3E1-AA90CF1BD8E3}" type="datetimeFigureOut">
               <a:rPr lang="en-US" smtClean="0"/>
-              <a:t>10/15/2022</a:t>
+              <a:t>1/13/2023</a:t>
             </a:fld>
             <a:endParaRPr lang="en-US"/>
           </a:p>
@@ -1834,7 +1834,7 @@
           <a:p>
             <a:fld id="{503EB4F8-4288-471F-A3E1-AA90CF1BD8E3}" type="datetimeFigureOut">
               <a:rPr lang="en-US" smtClean="0"/>
-              <a:t>10/15/2022</a:t>
+              <a:t>1/13/2023</a:t>
             </a:fld>
             <a:endParaRPr lang="en-US"/>
           </a:p>
@@ -1975,7 +1975,7 @@
           <a:p>
             <a:fld id="{503EB4F8-4288-471F-A3E1-AA90CF1BD8E3}" type="datetimeFigureOut">
               <a:rPr lang="en-US" smtClean="0"/>
-              <a:t>10/15/2022</a:t>
+              <a:t>1/13/2023</a:t>
             </a:fld>
             <a:endParaRPr lang="en-US"/>
           </a:p>
@@ -2088,7 +2088,7 @@
           <a:p>
             <a:fld id="{503EB4F8-4288-471F-A3E1-AA90CF1BD8E3}" type="datetimeFigureOut">
               <a:rPr lang="en-US" smtClean="0"/>
-              <a:t>10/15/2022</a:t>
+              <a:t>1/13/2023</a:t>
             </a:fld>
             <a:endParaRPr lang="en-US"/>
           </a:p>
@@ -2399,7 +2399,7 @@
           <a:p>
             <a:fld id="{503EB4F8-4288-471F-A3E1-AA90CF1BD8E3}" type="datetimeFigureOut">
               <a:rPr lang="en-US" smtClean="0"/>
-              <a:t>10/15/2022</a:t>
+              <a:t>1/13/2023</a:t>
             </a:fld>
             <a:endParaRPr lang="en-US"/>
           </a:p>
@@ -2687,7 +2687,7 @@
           <a:p>
             <a:fld id="{503EB4F8-4288-471F-A3E1-AA90CF1BD8E3}" type="datetimeFigureOut">
               <a:rPr lang="en-US" smtClean="0"/>
-              <a:t>10/15/2022</a:t>
+              <a:t>1/13/2023</a:t>
             </a:fld>
             <a:endParaRPr lang="en-US"/>
           </a:p>
@@ -2928,7 +2928,7 @@
           <a:p>
             <a:fld id="{503EB4F8-4288-471F-A3E1-AA90CF1BD8E3}" type="datetimeFigureOut">
               <a:rPr lang="en-US" smtClean="0"/>
-              <a:t>10/15/2022</a:t>
+              <a:t>1/13/2023</a:t>
             </a:fld>
             <a:endParaRPr lang="en-US"/>
           </a:p>
@@ -10200,8 +10200,8 @@
           <a:chExt cx="0" cy="0"/>
         </a:xfrm>
       </p:grpSpPr>
-      <mc:AlternateContent xmlns:mc="http://schemas.openxmlformats.org/markup-compatibility/2006" xmlns:a14="http://schemas.microsoft.com/office/drawing/2010/main">
-        <mc:Choice Requires="a14">
+      <mc:AlternateContent xmlns:mc="http://schemas.openxmlformats.org/markup-compatibility/2006">
+        <mc:Choice xmlns:a14="http://schemas.microsoft.com/office/drawing/2010/main" Requires="a14">
           <p:sp>
             <p:nvSpPr>
               <p:cNvPr id="6" name="Subtitle 2">
@@ -10404,8 +10404,27 @@
                     <a:ea typeface="Calibri" panose="020F0502020204030204" pitchFamily="34" charset="0"/>
                     <a:cs typeface="Times New Roman" panose="02020603050405020304" pitchFamily="18" charset="0"/>
                   </a:rPr>
-                  <a:t>Calculation for one:</a:t>
+                  <a:t>Full Calculation for one(before I </a:t>
                 </a:r>
+                <a:r>
+                  <a:rPr lang="en-US" sz="1600" b="1">
+                    <a:solidFill>
+                      <a:srgbClr val="FF0000"/>
+                    </a:solidFill>
+                    <a:latin typeface="Calibri" panose="020F0502020204030204" pitchFamily="34" charset="0"/>
+                    <a:ea typeface="Calibri" panose="020F0502020204030204" pitchFamily="34" charset="0"/>
+                    <a:cs typeface="Times New Roman" panose="02020603050405020304" pitchFamily="18" charset="0"/>
+                  </a:rPr>
+                  <a:t>calculate shortcut as you can seen):</a:t>
+                </a:r>
+                <a:endParaRPr lang="en-US" sz="1600" b="1" dirty="0">
+                  <a:solidFill>
+                    <a:srgbClr val="FF0000"/>
+                  </a:solidFill>
+                  <a:latin typeface="Calibri" panose="020F0502020204030204" pitchFamily="34" charset="0"/>
+                  <a:ea typeface="Calibri" panose="020F0502020204030204" pitchFamily="34" charset="0"/>
+                  <a:cs typeface="Times New Roman" panose="02020603050405020304" pitchFamily="18" charset="0"/>
+                </a:endParaRPr>
               </a:p>
               <a:p>
                 <a:pPr algn="l"/>
@@ -10944,7 +10963,7 @@
             </p:txBody>
           </p:sp>
         </mc:Choice>
-        <mc:Fallback xmlns="">
+        <mc:Fallback>
           <p:sp>
             <p:nvSpPr>
               <p:cNvPr id="6" name="Subtitle 2">

</xml_diff>